<commit_message>
Add rcamera.h. Add 3D object and displacement map of the Earth.
</commit_message>
<xml_diff>
--- a/docs/CodeCrafters.pptx
+++ b/docs/CodeCrafters.pptx
@@ -282,6 +282,11 @@
       </a:defRPr>
     </a:lvl9pPr>
   </p:defaultTextStyle>
+  <p:extLst>
+    <p:ext uri="{EFAFB233-063F-42B5-8137-9DF3F51BA10A}">
+      <p15:sldGuideLst xmlns:p15="http://schemas.microsoft.com/office/powerpoint/2012/main"/>
+    </p:ext>
+  </p:extLst>
 </p:presentation>
 </file>
 
@@ -26503,6 +26508,18 @@
   <p:clrMapOvr>
     <a:masterClrMapping/>
   </p:clrMapOvr>
+  <mc:AlternateContent xmlns:mc="http://schemas.openxmlformats.org/markup-compatibility/2006">
+    <mc:Choice xmlns:p159="http://schemas.microsoft.com/office/powerpoint/2015/09/main" Requires="p159">
+      <p:transition xmlns:p14="http://schemas.microsoft.com/office/powerpoint/2010/main" spd="slow" p14:dur="2000">
+        <p159:morph option="byObject"/>
+      </p:transition>
+    </mc:Choice>
+    <mc:Fallback>
+      <p:transition spd="slow">
+        <p:fade/>
+      </p:transition>
+    </mc:Fallback>
+  </mc:AlternateContent>
 </p:sld>
 </file>
 
@@ -26898,6 +26915,18 @@
   <p:clrMapOvr>
     <a:masterClrMapping/>
   </p:clrMapOvr>
+  <mc:AlternateContent xmlns:mc="http://schemas.openxmlformats.org/markup-compatibility/2006">
+    <mc:Choice xmlns:p159="http://schemas.microsoft.com/office/powerpoint/2015/09/main" Requires="p159">
+      <p:transition xmlns:p14="http://schemas.microsoft.com/office/powerpoint/2010/main" spd="slow" p14:dur="2000">
+        <p159:morph option="byObject"/>
+      </p:transition>
+    </mc:Choice>
+    <mc:Fallback>
+      <p:transition spd="slow">
+        <p:fade/>
+      </p:transition>
+    </mc:Fallback>
+  </mc:AlternateContent>
 </p:sld>
 </file>
 
@@ -27205,386 +27234,18 @@
   <p:clrMapOvr>
     <a:masterClrMapping/>
   </p:clrMapOvr>
-  <p:timing>
-    <p:tnLst>
-      <p:par>
-        <p:cTn id="1" dur="indefinite" restart="never" nodeType="tmRoot">
-          <p:childTnLst>
-            <p:seq concurrent="1" nextAc="seek">
-              <p:cTn id="2" dur="indefinite" nodeType="mainSeq">
-                <p:childTnLst>
-                  <p:par>
-                    <p:cTn id="3" fill="hold">
-                      <p:stCondLst>
-                        <p:cond delay="indefinite"/>
-                        <p:cond evt="onBegin" delay="0">
-                          <p:tn val="2"/>
-                        </p:cond>
-                      </p:stCondLst>
-                      <p:childTnLst>
-                        <p:par>
-                          <p:cTn id="4" fill="hold">
-                            <p:stCondLst>
-                              <p:cond delay="0"/>
-                            </p:stCondLst>
-                            <p:childTnLst>
-                              <p:par>
-                                <p:cTn id="5" presetID="42" presetClass="entr" presetSubtype="0" fill="hold" nodeType="afterEffect">
-                                  <p:stCondLst>
-                                    <p:cond delay="0"/>
-                                  </p:stCondLst>
-                                  <p:childTnLst>
-                                    <p:set>
-                                      <p:cBhvr>
-                                        <p:cTn id="6" dur="1" fill="hold">
-                                          <p:stCondLst>
-                                            <p:cond delay="0"/>
-                                          </p:stCondLst>
-                                        </p:cTn>
-                                        <p:tgtEl>
-                                          <p:spTgt spid="6"/>
-                                        </p:tgtEl>
-                                        <p:attrNameLst>
-                                          <p:attrName>style.visibility</p:attrName>
-                                        </p:attrNameLst>
-                                      </p:cBhvr>
-                                      <p:to>
-                                        <p:strVal val="visible"/>
-                                      </p:to>
-                                    </p:set>
-                                    <p:animEffect transition="in" filter="fade">
-                                      <p:cBhvr>
-                                        <p:cTn id="7" dur="1000"/>
-                                        <p:tgtEl>
-                                          <p:spTgt spid="6"/>
-                                        </p:tgtEl>
-                                      </p:cBhvr>
-                                    </p:animEffect>
-                                    <p:anim calcmode="lin" valueType="num">
-                                      <p:cBhvr>
-                                        <p:cTn id="8" dur="1000" fill="hold"/>
-                                        <p:tgtEl>
-                                          <p:spTgt spid="6"/>
-                                        </p:tgtEl>
-                                        <p:attrNameLst>
-                                          <p:attrName>ppt_x</p:attrName>
-                                        </p:attrNameLst>
-                                      </p:cBhvr>
-                                      <p:tavLst>
-                                        <p:tav tm="0">
-                                          <p:val>
-                                            <p:strVal val="#ppt_x"/>
-                                          </p:val>
-                                        </p:tav>
-                                        <p:tav tm="100000">
-                                          <p:val>
-                                            <p:strVal val="#ppt_x"/>
-                                          </p:val>
-                                        </p:tav>
-                                      </p:tavLst>
-                                    </p:anim>
-                                    <p:anim calcmode="lin" valueType="num">
-                                      <p:cBhvr>
-                                        <p:cTn id="9" dur="1000" fill="hold"/>
-                                        <p:tgtEl>
-                                          <p:spTgt spid="6"/>
-                                        </p:tgtEl>
-                                        <p:attrNameLst>
-                                          <p:attrName>ppt_y</p:attrName>
-                                        </p:attrNameLst>
-                                      </p:cBhvr>
-                                      <p:tavLst>
-                                        <p:tav tm="0">
-                                          <p:val>
-                                            <p:strVal val="#ppt_y+.1"/>
-                                          </p:val>
-                                        </p:tav>
-                                        <p:tav tm="100000">
-                                          <p:val>
-                                            <p:strVal val="#ppt_y"/>
-                                          </p:val>
-                                        </p:tav>
-                                      </p:tavLst>
-                                    </p:anim>
-                                  </p:childTnLst>
-                                </p:cTn>
-                              </p:par>
-                              <p:par>
-                                <p:cTn id="10" presetID="42" presetClass="entr" presetSubtype="0" fill="hold" grpId="0" nodeType="withEffect">
-                                  <p:stCondLst>
-                                    <p:cond delay="0"/>
-                                  </p:stCondLst>
-                                  <p:childTnLst>
-                                    <p:set>
-                                      <p:cBhvr>
-                                        <p:cTn id="11" dur="1" fill="hold">
-                                          <p:stCondLst>
-                                            <p:cond delay="0"/>
-                                          </p:stCondLst>
-                                        </p:cTn>
-                                        <p:tgtEl>
-                                          <p:spTgt spid="7"/>
-                                        </p:tgtEl>
-                                        <p:attrNameLst>
-                                          <p:attrName>style.visibility</p:attrName>
-                                        </p:attrNameLst>
-                                      </p:cBhvr>
-                                      <p:to>
-                                        <p:strVal val="visible"/>
-                                      </p:to>
-                                    </p:set>
-                                    <p:animEffect transition="in" filter="fade">
-                                      <p:cBhvr>
-                                        <p:cTn id="12" dur="1000"/>
-                                        <p:tgtEl>
-                                          <p:spTgt spid="7"/>
-                                        </p:tgtEl>
-                                      </p:cBhvr>
-                                    </p:animEffect>
-                                    <p:anim calcmode="lin" valueType="num">
-                                      <p:cBhvr>
-                                        <p:cTn id="13" dur="1000" fill="hold"/>
-                                        <p:tgtEl>
-                                          <p:spTgt spid="7"/>
-                                        </p:tgtEl>
-                                        <p:attrNameLst>
-                                          <p:attrName>ppt_x</p:attrName>
-                                        </p:attrNameLst>
-                                      </p:cBhvr>
-                                      <p:tavLst>
-                                        <p:tav tm="0">
-                                          <p:val>
-                                            <p:strVal val="#ppt_x"/>
-                                          </p:val>
-                                        </p:tav>
-                                        <p:tav tm="100000">
-                                          <p:val>
-                                            <p:strVal val="#ppt_x"/>
-                                          </p:val>
-                                        </p:tav>
-                                      </p:tavLst>
-                                    </p:anim>
-                                    <p:anim calcmode="lin" valueType="num">
-                                      <p:cBhvr>
-                                        <p:cTn id="14" dur="1000" fill="hold"/>
-                                        <p:tgtEl>
-                                          <p:spTgt spid="7"/>
-                                        </p:tgtEl>
-                                        <p:attrNameLst>
-                                          <p:attrName>ppt_y</p:attrName>
-                                        </p:attrNameLst>
-                                      </p:cBhvr>
-                                      <p:tavLst>
-                                        <p:tav tm="0">
-                                          <p:val>
-                                            <p:strVal val="#ppt_y+.1"/>
-                                          </p:val>
-                                        </p:tav>
-                                        <p:tav tm="100000">
-                                          <p:val>
-                                            <p:strVal val="#ppt_y"/>
-                                          </p:val>
-                                        </p:tav>
-                                      </p:tavLst>
-                                    </p:anim>
-                                  </p:childTnLst>
-                                </p:cTn>
-                              </p:par>
-                              <p:par>
-                                <p:cTn id="15" presetID="42" presetClass="entr" presetSubtype="0" fill="hold" grpId="0" nodeType="withEffect">
-                                  <p:stCondLst>
-                                    <p:cond delay="0"/>
-                                  </p:stCondLst>
-                                  <p:childTnLst>
-                                    <p:set>
-                                      <p:cBhvr>
-                                        <p:cTn id="16" dur="1" fill="hold">
-                                          <p:stCondLst>
-                                            <p:cond delay="0"/>
-                                          </p:stCondLst>
-                                        </p:cTn>
-                                        <p:tgtEl>
-                                          <p:spTgt spid="12"/>
-                                        </p:tgtEl>
-                                        <p:attrNameLst>
-                                          <p:attrName>style.visibility</p:attrName>
-                                        </p:attrNameLst>
-                                      </p:cBhvr>
-                                      <p:to>
-                                        <p:strVal val="visible"/>
-                                      </p:to>
-                                    </p:set>
-                                    <p:animEffect transition="in" filter="fade">
-                                      <p:cBhvr>
-                                        <p:cTn id="17" dur="1000"/>
-                                        <p:tgtEl>
-                                          <p:spTgt spid="12"/>
-                                        </p:tgtEl>
-                                      </p:cBhvr>
-                                    </p:animEffect>
-                                    <p:anim calcmode="lin" valueType="num">
-                                      <p:cBhvr>
-                                        <p:cTn id="18" dur="1000" fill="hold"/>
-                                        <p:tgtEl>
-                                          <p:spTgt spid="12"/>
-                                        </p:tgtEl>
-                                        <p:attrNameLst>
-                                          <p:attrName>ppt_x</p:attrName>
-                                        </p:attrNameLst>
-                                      </p:cBhvr>
-                                      <p:tavLst>
-                                        <p:tav tm="0">
-                                          <p:val>
-                                            <p:strVal val="#ppt_x"/>
-                                          </p:val>
-                                        </p:tav>
-                                        <p:tav tm="100000">
-                                          <p:val>
-                                            <p:strVal val="#ppt_x"/>
-                                          </p:val>
-                                        </p:tav>
-                                      </p:tavLst>
-                                    </p:anim>
-                                    <p:anim calcmode="lin" valueType="num">
-                                      <p:cBhvr>
-                                        <p:cTn id="19" dur="1000" fill="hold"/>
-                                        <p:tgtEl>
-                                          <p:spTgt spid="12"/>
-                                        </p:tgtEl>
-                                        <p:attrNameLst>
-                                          <p:attrName>ppt_y</p:attrName>
-                                        </p:attrNameLst>
-                                      </p:cBhvr>
-                                      <p:tavLst>
-                                        <p:tav tm="0">
-                                          <p:val>
-                                            <p:strVal val="#ppt_y+.1"/>
-                                          </p:val>
-                                        </p:tav>
-                                        <p:tav tm="100000">
-                                          <p:val>
-                                            <p:strVal val="#ppt_y"/>
-                                          </p:val>
-                                        </p:tav>
-                                      </p:tavLst>
-                                    </p:anim>
-                                  </p:childTnLst>
-                                </p:cTn>
-                              </p:par>
-                              <p:par>
-                                <p:cTn id="20" presetID="42" presetClass="entr" presetSubtype="0" fill="hold" grpId="0" nodeType="withEffect">
-                                  <p:stCondLst>
-                                    <p:cond delay="0"/>
-                                  </p:stCondLst>
-                                  <p:childTnLst>
-                                    <p:set>
-                                      <p:cBhvr>
-                                        <p:cTn id="21" dur="1" fill="hold">
-                                          <p:stCondLst>
-                                            <p:cond delay="0"/>
-                                          </p:stCondLst>
-                                        </p:cTn>
-                                        <p:tgtEl>
-                                          <p:spTgt spid="13"/>
-                                        </p:tgtEl>
-                                        <p:attrNameLst>
-                                          <p:attrName>style.visibility</p:attrName>
-                                        </p:attrNameLst>
-                                      </p:cBhvr>
-                                      <p:to>
-                                        <p:strVal val="visible"/>
-                                      </p:to>
-                                    </p:set>
-                                    <p:animEffect transition="in" filter="fade">
-                                      <p:cBhvr>
-                                        <p:cTn id="22" dur="1000"/>
-                                        <p:tgtEl>
-                                          <p:spTgt spid="13"/>
-                                        </p:tgtEl>
-                                      </p:cBhvr>
-                                    </p:animEffect>
-                                    <p:anim calcmode="lin" valueType="num">
-                                      <p:cBhvr>
-                                        <p:cTn id="23" dur="1000" fill="hold"/>
-                                        <p:tgtEl>
-                                          <p:spTgt spid="13"/>
-                                        </p:tgtEl>
-                                        <p:attrNameLst>
-                                          <p:attrName>ppt_x</p:attrName>
-                                        </p:attrNameLst>
-                                      </p:cBhvr>
-                                      <p:tavLst>
-                                        <p:tav tm="0">
-                                          <p:val>
-                                            <p:strVal val="#ppt_x"/>
-                                          </p:val>
-                                        </p:tav>
-                                        <p:tav tm="100000">
-                                          <p:val>
-                                            <p:strVal val="#ppt_x"/>
-                                          </p:val>
-                                        </p:tav>
-                                      </p:tavLst>
-                                    </p:anim>
-                                    <p:anim calcmode="lin" valueType="num">
-                                      <p:cBhvr>
-                                        <p:cTn id="24" dur="1000" fill="hold"/>
-                                        <p:tgtEl>
-                                          <p:spTgt spid="13"/>
-                                        </p:tgtEl>
-                                        <p:attrNameLst>
-                                          <p:attrName>ppt_y</p:attrName>
-                                        </p:attrNameLst>
-                                      </p:cBhvr>
-                                      <p:tavLst>
-                                        <p:tav tm="0">
-                                          <p:val>
-                                            <p:strVal val="#ppt_y+.1"/>
-                                          </p:val>
-                                        </p:tav>
-                                        <p:tav tm="100000">
-                                          <p:val>
-                                            <p:strVal val="#ppt_y"/>
-                                          </p:val>
-                                        </p:tav>
-                                      </p:tavLst>
-                                    </p:anim>
-                                  </p:childTnLst>
-                                </p:cTn>
-                              </p:par>
-                            </p:childTnLst>
-                          </p:cTn>
-                        </p:par>
-                      </p:childTnLst>
-                    </p:cTn>
-                  </p:par>
-                </p:childTnLst>
-              </p:cTn>
-              <p:prevCondLst>
-                <p:cond evt="onPrev" delay="0">
-                  <p:tgtEl>
-                    <p:sldTgt/>
-                  </p:tgtEl>
-                </p:cond>
-              </p:prevCondLst>
-              <p:nextCondLst>
-                <p:cond evt="onNext" delay="0">
-                  <p:tgtEl>
-                    <p:sldTgt/>
-                  </p:tgtEl>
-                </p:cond>
-              </p:nextCondLst>
-            </p:seq>
-          </p:childTnLst>
-        </p:cTn>
-      </p:par>
-    </p:tnLst>
-    <p:bldLst>
-      <p:bldP spid="7" grpId="0"/>
-      <p:bldP spid="12" grpId="0"/>
-      <p:bldP spid="13" grpId="0"/>
-    </p:bldLst>
-  </p:timing>
+  <mc:AlternateContent xmlns:mc="http://schemas.openxmlformats.org/markup-compatibility/2006">
+    <mc:Choice xmlns:p159="http://schemas.microsoft.com/office/powerpoint/2015/09/main" Requires="p159">
+      <p:transition xmlns:p14="http://schemas.microsoft.com/office/powerpoint/2010/main" spd="slow" p14:dur="2000">
+        <p159:morph option="byObject"/>
+      </p:transition>
+    </mc:Choice>
+    <mc:Fallback>
+      <p:transition spd="slow">
+        <p:fade/>
+      </p:transition>
+    </mc:Fallback>
+  </mc:AlternateContent>
 </p:sld>
 </file>
 
@@ -27746,141 +27407,18 @@
   <p:clrMapOvr>
     <a:masterClrMapping/>
   </p:clrMapOvr>
-  <p:timing>
-    <p:tnLst>
-      <p:par>
-        <p:cTn id="1" dur="indefinite" restart="never" nodeType="tmRoot">
-          <p:childTnLst>
-            <p:seq concurrent="1" nextAc="seek">
-              <p:cTn id="2" dur="indefinite" nodeType="mainSeq">
-                <p:childTnLst>
-                  <p:par>
-                    <p:cTn id="3" fill="hold">
-                      <p:stCondLst>
-                        <p:cond delay="indefinite"/>
-                        <p:cond evt="onBegin" delay="0">
-                          <p:tn val="2"/>
-                        </p:cond>
-                      </p:stCondLst>
-                      <p:childTnLst>
-                        <p:par>
-                          <p:cTn id="4" fill="hold">
-                            <p:stCondLst>
-                              <p:cond delay="0"/>
-                            </p:stCondLst>
-                            <p:childTnLst>
-                              <p:par>
-                                <p:cTn id="5" presetID="42" presetClass="entr" presetSubtype="0" fill="hold" grpId="0" nodeType="withEffect">
-                                  <p:stCondLst>
-                                    <p:cond delay="0"/>
-                                  </p:stCondLst>
-                                  <p:childTnLst>
-                                    <p:set>
-                                      <p:cBhvr>
-                                        <p:cTn id="6" dur="1" fill="hold">
-                                          <p:stCondLst>
-                                            <p:cond delay="0"/>
-                                          </p:stCondLst>
-                                        </p:cTn>
-                                        <p:tgtEl>
-                                          <p:spTgt spid="7"/>
-                                        </p:tgtEl>
-                                        <p:attrNameLst>
-                                          <p:attrName>style.visibility</p:attrName>
-                                        </p:attrNameLst>
-                                      </p:cBhvr>
-                                      <p:to>
-                                        <p:strVal val="visible"/>
-                                      </p:to>
-                                    </p:set>
-                                    <p:animEffect transition="in" filter="fade">
-                                      <p:cBhvr>
-                                        <p:cTn id="7" dur="1000"/>
-                                        <p:tgtEl>
-                                          <p:spTgt spid="7"/>
-                                        </p:tgtEl>
-                                      </p:cBhvr>
-                                    </p:animEffect>
-                                    <p:anim calcmode="lin" valueType="num">
-                                      <p:cBhvr>
-                                        <p:cTn id="8" dur="1000" fill="hold"/>
-                                        <p:tgtEl>
-                                          <p:spTgt spid="7"/>
-                                        </p:tgtEl>
-                                        <p:attrNameLst>
-                                          <p:attrName>ppt_x</p:attrName>
-                                        </p:attrNameLst>
-                                      </p:cBhvr>
-                                      <p:tavLst>
-                                        <p:tav tm="0">
-                                          <p:val>
-                                            <p:strVal val="#ppt_x"/>
-                                          </p:val>
-                                        </p:tav>
-                                        <p:tav tm="100000">
-                                          <p:val>
-                                            <p:strVal val="#ppt_x"/>
-                                          </p:val>
-                                        </p:tav>
-                                      </p:tavLst>
-                                    </p:anim>
-                                    <p:anim calcmode="lin" valueType="num">
-                                      <p:cBhvr>
-                                        <p:cTn id="9" dur="1000" fill="hold"/>
-                                        <p:tgtEl>
-                                          <p:spTgt spid="7"/>
-                                        </p:tgtEl>
-                                        <p:attrNameLst>
-                                          <p:attrName>ppt_y</p:attrName>
-                                        </p:attrNameLst>
-                                      </p:cBhvr>
-                                      <p:tavLst>
-                                        <p:tav tm="0">
-                                          <p:val>
-                                            <p:strVal val="#ppt_y+.1"/>
-                                          </p:val>
-                                        </p:tav>
-                                        <p:tav tm="100000">
-                                          <p:val>
-                                            <p:strVal val="#ppt_y"/>
-                                          </p:val>
-                                        </p:tav>
-                                      </p:tavLst>
-                                    </p:anim>
-                                  </p:childTnLst>
-                                </p:cTn>
-                              </p:par>
-                            </p:childTnLst>
-                          </p:cTn>
-                        </p:par>
-                      </p:childTnLst>
-                    </p:cTn>
-                  </p:par>
-                </p:childTnLst>
-              </p:cTn>
-              <p:prevCondLst>
-                <p:cond evt="onPrev" delay="0">
-                  <p:tgtEl>
-                    <p:sldTgt/>
-                  </p:tgtEl>
-                </p:cond>
-              </p:prevCondLst>
-              <p:nextCondLst>
-                <p:cond evt="onNext" delay="0">
-                  <p:tgtEl>
-                    <p:sldTgt/>
-                  </p:tgtEl>
-                </p:cond>
-              </p:nextCondLst>
-            </p:seq>
-          </p:childTnLst>
-        </p:cTn>
-      </p:par>
-    </p:tnLst>
-    <p:bldLst>
-      <p:bldP spid="7" grpId="0"/>
-    </p:bldLst>
-  </p:timing>
+  <mc:AlternateContent xmlns:mc="http://schemas.openxmlformats.org/markup-compatibility/2006">
+    <mc:Choice xmlns:p159="http://schemas.microsoft.com/office/powerpoint/2015/09/main" Requires="p159">
+      <p:transition xmlns:p14="http://schemas.microsoft.com/office/powerpoint/2010/main" spd="slow" p14:dur="2000">
+        <p159:morph option="byObject"/>
+      </p:transition>
+    </mc:Choice>
+    <mc:Fallback>
+      <p:transition spd="slow">
+        <p:fade/>
+      </p:transition>
+    </mc:Fallback>
+  </mc:AlternateContent>
 </p:sld>
 </file>
 
@@ -27955,7 +27493,7 @@
         <p:spPr>
           <a:xfrm>
             <a:off x="400929" y="2179334"/>
-            <a:ext cx="3974123" cy="784830"/>
+            <a:ext cx="3974123" cy="1015663"/>
           </a:xfrm>
           <a:prstGeom prst="rect">
             <a:avLst/>
@@ -27985,7 +27523,7 @@
               <a:rPr lang="en-US" sz="1500" b="1" dirty="0">
                 <a:latin typeface="Consolas" panose="020B0609020204030204" pitchFamily="49" charset="0"/>
               </a:rPr>
-              <a:t> that allows the user to educate themselves on the solar system more.</a:t>
+              <a:t> that allows the user to view and to understand how planets are structured in a 3D animation.</a:t>
             </a:r>
           </a:p>
         </p:txBody>
@@ -28038,15 +27576,6 @@
           <a:effectLst>
             <a:reflection blurRad="12700" stA="38000" endPos="28000" dist="5000" dir="5400000" sy="-100000" algn="bl" rotWithShape="0"/>
           </a:effectLst>
-          <a:extLst>
-            <a:ext uri="{909E8E84-426E-40DD-AFC4-6F175D3DCCD1}">
-              <a14:hiddenFill xmlns:a14="http://schemas.microsoft.com/office/drawing/2010/main">
-                <a:solidFill>
-                  <a:srgbClr val="FFFFFF"/>
-                </a:solidFill>
-              </a14:hiddenFill>
-            </a:ext>
-          </a:extLst>
         </p:spPr>
       </p:pic>
     </p:spTree>
@@ -28059,6 +27588,18 @@
   <p:clrMapOvr>
     <a:masterClrMapping/>
   </p:clrMapOvr>
+  <mc:AlternateContent xmlns:mc="http://schemas.openxmlformats.org/markup-compatibility/2006">
+    <mc:Choice xmlns:p159="http://schemas.microsoft.com/office/powerpoint/2015/09/main" Requires="p159">
+      <p:transition xmlns:p14="http://schemas.microsoft.com/office/powerpoint/2010/main" spd="slow" p14:dur="2000">
+        <p159:morph option="byObject"/>
+      </p:transition>
+    </mc:Choice>
+    <mc:Fallback>
+      <p:transition spd="slow">
+        <p:fade/>
+      </p:transition>
+    </mc:Fallback>
+  </mc:AlternateContent>
 </p:sld>
 </file>
 
@@ -28456,577 +27997,18 @@
   <p:clrMapOvr>
     <a:masterClrMapping/>
   </p:clrMapOvr>
-  <p:timing>
-    <p:tnLst>
-      <p:par>
-        <p:cTn id="1" dur="indefinite" restart="never" nodeType="tmRoot">
-          <p:childTnLst>
-            <p:seq concurrent="1" nextAc="seek">
-              <p:cTn id="2" dur="indefinite" nodeType="mainSeq">
-                <p:childTnLst>
-                  <p:par>
-                    <p:cTn id="3" fill="hold">
-                      <p:stCondLst>
-                        <p:cond delay="indefinite"/>
-                        <p:cond evt="onBegin" delay="0">
-                          <p:tn val="2"/>
-                        </p:cond>
-                      </p:stCondLst>
-                      <p:childTnLst>
-                        <p:par>
-                          <p:cTn id="4" fill="hold">
-                            <p:stCondLst>
-                              <p:cond delay="0"/>
-                            </p:stCondLst>
-                            <p:childTnLst>
-                              <p:par>
-                                <p:cTn id="5" presetID="31" presetClass="entr" presetSubtype="0" fill="hold" nodeType="withEffect">
-                                  <p:stCondLst>
-                                    <p:cond delay="250"/>
-                                  </p:stCondLst>
-                                  <p:childTnLst>
-                                    <p:set>
-                                      <p:cBhvr>
-                                        <p:cTn id="6" dur="1" fill="hold">
-                                          <p:stCondLst>
-                                            <p:cond delay="0"/>
-                                          </p:stCondLst>
-                                        </p:cTn>
-                                        <p:tgtEl>
-                                          <p:spTgt spid="2"/>
-                                        </p:tgtEl>
-                                        <p:attrNameLst>
-                                          <p:attrName>style.visibility</p:attrName>
-                                        </p:attrNameLst>
-                                      </p:cBhvr>
-                                      <p:to>
-                                        <p:strVal val="visible"/>
-                                      </p:to>
-                                    </p:set>
-                                    <p:anim calcmode="lin" valueType="num">
-                                      <p:cBhvr>
-                                        <p:cTn id="7" dur="750" fill="hold"/>
-                                        <p:tgtEl>
-                                          <p:spTgt spid="2"/>
-                                        </p:tgtEl>
-                                        <p:attrNameLst>
-                                          <p:attrName>ppt_w</p:attrName>
-                                        </p:attrNameLst>
-                                      </p:cBhvr>
-                                      <p:tavLst>
-                                        <p:tav tm="0">
-                                          <p:val>
-                                            <p:fltVal val="0"/>
-                                          </p:val>
-                                        </p:tav>
-                                        <p:tav tm="100000">
-                                          <p:val>
-                                            <p:strVal val="#ppt_w"/>
-                                          </p:val>
-                                        </p:tav>
-                                      </p:tavLst>
-                                    </p:anim>
-                                    <p:anim calcmode="lin" valueType="num">
-                                      <p:cBhvr>
-                                        <p:cTn id="8" dur="750" fill="hold"/>
-                                        <p:tgtEl>
-                                          <p:spTgt spid="2"/>
-                                        </p:tgtEl>
-                                        <p:attrNameLst>
-                                          <p:attrName>ppt_h</p:attrName>
-                                        </p:attrNameLst>
-                                      </p:cBhvr>
-                                      <p:tavLst>
-                                        <p:tav tm="0">
-                                          <p:val>
-                                            <p:fltVal val="0"/>
-                                          </p:val>
-                                        </p:tav>
-                                        <p:tav tm="100000">
-                                          <p:val>
-                                            <p:strVal val="#ppt_h"/>
-                                          </p:val>
-                                        </p:tav>
-                                      </p:tavLst>
-                                    </p:anim>
-                                    <p:anim calcmode="lin" valueType="num">
-                                      <p:cBhvr>
-                                        <p:cTn id="9" dur="750" fill="hold"/>
-                                        <p:tgtEl>
-                                          <p:spTgt spid="2"/>
-                                        </p:tgtEl>
-                                        <p:attrNameLst>
-                                          <p:attrName>style.rotation</p:attrName>
-                                        </p:attrNameLst>
-                                      </p:cBhvr>
-                                      <p:tavLst>
-                                        <p:tav tm="0">
-                                          <p:val>
-                                            <p:fltVal val="90"/>
-                                          </p:val>
-                                        </p:tav>
-                                        <p:tav tm="100000">
-                                          <p:val>
-                                            <p:fltVal val="0"/>
-                                          </p:val>
-                                        </p:tav>
-                                      </p:tavLst>
-                                    </p:anim>
-                                    <p:animEffect transition="in" filter="fade">
-                                      <p:cBhvr>
-                                        <p:cTn id="10" dur="750"/>
-                                        <p:tgtEl>
-                                          <p:spTgt spid="2"/>
-                                        </p:tgtEl>
-                                      </p:cBhvr>
-                                    </p:animEffect>
-                                  </p:childTnLst>
-                                </p:cTn>
-                              </p:par>
-                              <p:par>
-                                <p:cTn id="11" presetID="31" presetClass="entr" presetSubtype="0" fill="hold" nodeType="withEffect">
-                                  <p:stCondLst>
-                                    <p:cond delay="250"/>
-                                  </p:stCondLst>
-                                  <p:childTnLst>
-                                    <p:set>
-                                      <p:cBhvr>
-                                        <p:cTn id="12" dur="1" fill="hold">
-                                          <p:stCondLst>
-                                            <p:cond delay="0"/>
-                                          </p:stCondLst>
-                                        </p:cTn>
-                                        <p:tgtEl>
-                                          <p:spTgt spid="5"/>
-                                        </p:tgtEl>
-                                        <p:attrNameLst>
-                                          <p:attrName>style.visibility</p:attrName>
-                                        </p:attrNameLst>
-                                      </p:cBhvr>
-                                      <p:to>
-                                        <p:strVal val="visible"/>
-                                      </p:to>
-                                    </p:set>
-                                    <p:anim calcmode="lin" valueType="num">
-                                      <p:cBhvr>
-                                        <p:cTn id="13" dur="750" fill="hold"/>
-                                        <p:tgtEl>
-                                          <p:spTgt spid="5"/>
-                                        </p:tgtEl>
-                                        <p:attrNameLst>
-                                          <p:attrName>ppt_w</p:attrName>
-                                        </p:attrNameLst>
-                                      </p:cBhvr>
-                                      <p:tavLst>
-                                        <p:tav tm="0">
-                                          <p:val>
-                                            <p:fltVal val="0"/>
-                                          </p:val>
-                                        </p:tav>
-                                        <p:tav tm="100000">
-                                          <p:val>
-                                            <p:strVal val="#ppt_w"/>
-                                          </p:val>
-                                        </p:tav>
-                                      </p:tavLst>
-                                    </p:anim>
-                                    <p:anim calcmode="lin" valueType="num">
-                                      <p:cBhvr>
-                                        <p:cTn id="14" dur="750" fill="hold"/>
-                                        <p:tgtEl>
-                                          <p:spTgt spid="5"/>
-                                        </p:tgtEl>
-                                        <p:attrNameLst>
-                                          <p:attrName>ppt_h</p:attrName>
-                                        </p:attrNameLst>
-                                      </p:cBhvr>
-                                      <p:tavLst>
-                                        <p:tav tm="0">
-                                          <p:val>
-                                            <p:fltVal val="0"/>
-                                          </p:val>
-                                        </p:tav>
-                                        <p:tav tm="100000">
-                                          <p:val>
-                                            <p:strVal val="#ppt_h"/>
-                                          </p:val>
-                                        </p:tav>
-                                      </p:tavLst>
-                                    </p:anim>
-                                    <p:anim calcmode="lin" valueType="num">
-                                      <p:cBhvr>
-                                        <p:cTn id="15" dur="750" fill="hold"/>
-                                        <p:tgtEl>
-                                          <p:spTgt spid="5"/>
-                                        </p:tgtEl>
-                                        <p:attrNameLst>
-                                          <p:attrName>style.rotation</p:attrName>
-                                        </p:attrNameLst>
-                                      </p:cBhvr>
-                                      <p:tavLst>
-                                        <p:tav tm="0">
-                                          <p:val>
-                                            <p:fltVal val="90"/>
-                                          </p:val>
-                                        </p:tav>
-                                        <p:tav tm="100000">
-                                          <p:val>
-                                            <p:fltVal val="0"/>
-                                          </p:val>
-                                        </p:tav>
-                                      </p:tavLst>
-                                    </p:anim>
-                                    <p:animEffect transition="in" filter="fade">
-                                      <p:cBhvr>
-                                        <p:cTn id="16" dur="750"/>
-                                        <p:tgtEl>
-                                          <p:spTgt spid="5"/>
-                                        </p:tgtEl>
-                                      </p:cBhvr>
-                                    </p:animEffect>
-                                  </p:childTnLst>
-                                </p:cTn>
-                              </p:par>
-                              <p:par>
-                                <p:cTn id="17" presetID="31" presetClass="entr" presetSubtype="0" fill="hold" nodeType="withEffect">
-                                  <p:stCondLst>
-                                    <p:cond delay="250"/>
-                                  </p:stCondLst>
-                                  <p:childTnLst>
-                                    <p:set>
-                                      <p:cBhvr>
-                                        <p:cTn id="18" dur="1" fill="hold">
-                                          <p:stCondLst>
-                                            <p:cond delay="0"/>
-                                          </p:stCondLst>
-                                        </p:cTn>
-                                        <p:tgtEl>
-                                          <p:spTgt spid="6"/>
-                                        </p:tgtEl>
-                                        <p:attrNameLst>
-                                          <p:attrName>style.visibility</p:attrName>
-                                        </p:attrNameLst>
-                                      </p:cBhvr>
-                                      <p:to>
-                                        <p:strVal val="visible"/>
-                                      </p:to>
-                                    </p:set>
-                                    <p:anim calcmode="lin" valueType="num">
-                                      <p:cBhvr>
-                                        <p:cTn id="19" dur="750" fill="hold"/>
-                                        <p:tgtEl>
-                                          <p:spTgt spid="6"/>
-                                        </p:tgtEl>
-                                        <p:attrNameLst>
-                                          <p:attrName>ppt_w</p:attrName>
-                                        </p:attrNameLst>
-                                      </p:cBhvr>
-                                      <p:tavLst>
-                                        <p:tav tm="0">
-                                          <p:val>
-                                            <p:fltVal val="0"/>
-                                          </p:val>
-                                        </p:tav>
-                                        <p:tav tm="100000">
-                                          <p:val>
-                                            <p:strVal val="#ppt_w"/>
-                                          </p:val>
-                                        </p:tav>
-                                      </p:tavLst>
-                                    </p:anim>
-                                    <p:anim calcmode="lin" valueType="num">
-                                      <p:cBhvr>
-                                        <p:cTn id="20" dur="750" fill="hold"/>
-                                        <p:tgtEl>
-                                          <p:spTgt spid="6"/>
-                                        </p:tgtEl>
-                                        <p:attrNameLst>
-                                          <p:attrName>ppt_h</p:attrName>
-                                        </p:attrNameLst>
-                                      </p:cBhvr>
-                                      <p:tavLst>
-                                        <p:tav tm="0">
-                                          <p:val>
-                                            <p:fltVal val="0"/>
-                                          </p:val>
-                                        </p:tav>
-                                        <p:tav tm="100000">
-                                          <p:val>
-                                            <p:strVal val="#ppt_h"/>
-                                          </p:val>
-                                        </p:tav>
-                                      </p:tavLst>
-                                    </p:anim>
-                                    <p:anim calcmode="lin" valueType="num">
-                                      <p:cBhvr>
-                                        <p:cTn id="21" dur="750" fill="hold"/>
-                                        <p:tgtEl>
-                                          <p:spTgt spid="6"/>
-                                        </p:tgtEl>
-                                        <p:attrNameLst>
-                                          <p:attrName>style.rotation</p:attrName>
-                                        </p:attrNameLst>
-                                      </p:cBhvr>
-                                      <p:tavLst>
-                                        <p:tav tm="0">
-                                          <p:val>
-                                            <p:fltVal val="90"/>
-                                          </p:val>
-                                        </p:tav>
-                                        <p:tav tm="100000">
-                                          <p:val>
-                                            <p:fltVal val="0"/>
-                                          </p:val>
-                                        </p:tav>
-                                      </p:tavLst>
-                                    </p:anim>
-                                    <p:animEffect transition="in" filter="fade">
-                                      <p:cBhvr>
-                                        <p:cTn id="22" dur="750"/>
-                                        <p:tgtEl>
-                                          <p:spTgt spid="6"/>
-                                        </p:tgtEl>
-                                      </p:cBhvr>
-                                    </p:animEffect>
-                                  </p:childTnLst>
-                                </p:cTn>
-                              </p:par>
-                              <p:par>
-                                <p:cTn id="23" presetID="31" presetClass="entr" presetSubtype="0" fill="hold" nodeType="withEffect">
-                                  <p:stCondLst>
-                                    <p:cond delay="250"/>
-                                  </p:stCondLst>
-                                  <p:childTnLst>
-                                    <p:set>
-                                      <p:cBhvr>
-                                        <p:cTn id="24" dur="1" fill="hold">
-                                          <p:stCondLst>
-                                            <p:cond delay="0"/>
-                                          </p:stCondLst>
-                                        </p:cTn>
-                                        <p:tgtEl>
-                                          <p:spTgt spid="7"/>
-                                        </p:tgtEl>
-                                        <p:attrNameLst>
-                                          <p:attrName>style.visibility</p:attrName>
-                                        </p:attrNameLst>
-                                      </p:cBhvr>
-                                      <p:to>
-                                        <p:strVal val="visible"/>
-                                      </p:to>
-                                    </p:set>
-                                    <p:anim calcmode="lin" valueType="num">
-                                      <p:cBhvr>
-                                        <p:cTn id="25" dur="750" fill="hold"/>
-                                        <p:tgtEl>
-                                          <p:spTgt spid="7"/>
-                                        </p:tgtEl>
-                                        <p:attrNameLst>
-                                          <p:attrName>ppt_w</p:attrName>
-                                        </p:attrNameLst>
-                                      </p:cBhvr>
-                                      <p:tavLst>
-                                        <p:tav tm="0">
-                                          <p:val>
-                                            <p:fltVal val="0"/>
-                                          </p:val>
-                                        </p:tav>
-                                        <p:tav tm="100000">
-                                          <p:val>
-                                            <p:strVal val="#ppt_w"/>
-                                          </p:val>
-                                        </p:tav>
-                                      </p:tavLst>
-                                    </p:anim>
-                                    <p:anim calcmode="lin" valueType="num">
-                                      <p:cBhvr>
-                                        <p:cTn id="26" dur="750" fill="hold"/>
-                                        <p:tgtEl>
-                                          <p:spTgt spid="7"/>
-                                        </p:tgtEl>
-                                        <p:attrNameLst>
-                                          <p:attrName>ppt_h</p:attrName>
-                                        </p:attrNameLst>
-                                      </p:cBhvr>
-                                      <p:tavLst>
-                                        <p:tav tm="0">
-                                          <p:val>
-                                            <p:fltVal val="0"/>
-                                          </p:val>
-                                        </p:tav>
-                                        <p:tav tm="100000">
-                                          <p:val>
-                                            <p:strVal val="#ppt_h"/>
-                                          </p:val>
-                                        </p:tav>
-                                      </p:tavLst>
-                                    </p:anim>
-                                    <p:anim calcmode="lin" valueType="num">
-                                      <p:cBhvr>
-                                        <p:cTn id="27" dur="750" fill="hold"/>
-                                        <p:tgtEl>
-                                          <p:spTgt spid="7"/>
-                                        </p:tgtEl>
-                                        <p:attrNameLst>
-                                          <p:attrName>style.rotation</p:attrName>
-                                        </p:attrNameLst>
-                                      </p:cBhvr>
-                                      <p:tavLst>
-                                        <p:tav tm="0">
-                                          <p:val>
-                                            <p:fltVal val="90"/>
-                                          </p:val>
-                                        </p:tav>
-                                        <p:tav tm="100000">
-                                          <p:val>
-                                            <p:fltVal val="0"/>
-                                          </p:val>
-                                        </p:tav>
-                                      </p:tavLst>
-                                    </p:anim>
-                                    <p:animEffect transition="in" filter="fade">
-                                      <p:cBhvr>
-                                        <p:cTn id="28" dur="750"/>
-                                        <p:tgtEl>
-                                          <p:spTgt spid="7"/>
-                                        </p:tgtEl>
-                                      </p:cBhvr>
-                                    </p:animEffect>
-                                  </p:childTnLst>
-                                </p:cTn>
-                              </p:par>
-                              <p:par>
-                                <p:cTn id="29" presetID="31" presetClass="entr" presetSubtype="0" fill="hold" nodeType="withEffect">
-                                  <p:stCondLst>
-                                    <p:cond delay="250"/>
-                                  </p:stCondLst>
-                                  <p:childTnLst>
-                                    <p:set>
-                                      <p:cBhvr>
-                                        <p:cTn id="30" dur="1" fill="hold">
-                                          <p:stCondLst>
-                                            <p:cond delay="0"/>
-                                          </p:stCondLst>
-                                        </p:cTn>
-                                        <p:tgtEl>
-                                          <p:spTgt spid="8"/>
-                                        </p:tgtEl>
-                                        <p:attrNameLst>
-                                          <p:attrName>style.visibility</p:attrName>
-                                        </p:attrNameLst>
-                                      </p:cBhvr>
-                                      <p:to>
-                                        <p:strVal val="visible"/>
-                                      </p:to>
-                                    </p:set>
-                                    <p:anim calcmode="lin" valueType="num">
-                                      <p:cBhvr>
-                                        <p:cTn id="31" dur="750" fill="hold"/>
-                                        <p:tgtEl>
-                                          <p:spTgt spid="8"/>
-                                        </p:tgtEl>
-                                        <p:attrNameLst>
-                                          <p:attrName>ppt_w</p:attrName>
-                                        </p:attrNameLst>
-                                      </p:cBhvr>
-                                      <p:tavLst>
-                                        <p:tav tm="0">
-                                          <p:val>
-                                            <p:fltVal val="0"/>
-                                          </p:val>
-                                        </p:tav>
-                                        <p:tav tm="100000">
-                                          <p:val>
-                                            <p:strVal val="#ppt_w"/>
-                                          </p:val>
-                                        </p:tav>
-                                      </p:tavLst>
-                                    </p:anim>
-                                    <p:anim calcmode="lin" valueType="num">
-                                      <p:cBhvr>
-                                        <p:cTn id="32" dur="750" fill="hold"/>
-                                        <p:tgtEl>
-                                          <p:spTgt spid="8"/>
-                                        </p:tgtEl>
-                                        <p:attrNameLst>
-                                          <p:attrName>ppt_h</p:attrName>
-                                        </p:attrNameLst>
-                                      </p:cBhvr>
-                                      <p:tavLst>
-                                        <p:tav tm="0">
-                                          <p:val>
-                                            <p:fltVal val="0"/>
-                                          </p:val>
-                                        </p:tav>
-                                        <p:tav tm="100000">
-                                          <p:val>
-                                            <p:strVal val="#ppt_h"/>
-                                          </p:val>
-                                        </p:tav>
-                                      </p:tavLst>
-                                    </p:anim>
-                                    <p:anim calcmode="lin" valueType="num">
-                                      <p:cBhvr>
-                                        <p:cTn id="33" dur="750" fill="hold"/>
-                                        <p:tgtEl>
-                                          <p:spTgt spid="8"/>
-                                        </p:tgtEl>
-                                        <p:attrNameLst>
-                                          <p:attrName>style.rotation</p:attrName>
-                                        </p:attrNameLst>
-                                      </p:cBhvr>
-                                      <p:tavLst>
-                                        <p:tav tm="0">
-                                          <p:val>
-                                            <p:fltVal val="90"/>
-                                          </p:val>
-                                        </p:tav>
-                                        <p:tav tm="100000">
-                                          <p:val>
-                                            <p:fltVal val="0"/>
-                                          </p:val>
-                                        </p:tav>
-                                      </p:tavLst>
-                                    </p:anim>
-                                    <p:animEffect transition="in" filter="fade">
-                                      <p:cBhvr>
-                                        <p:cTn id="34" dur="750"/>
-                                        <p:tgtEl>
-                                          <p:spTgt spid="8"/>
-                                        </p:tgtEl>
-                                      </p:cBhvr>
-                                    </p:animEffect>
-                                  </p:childTnLst>
-                                </p:cTn>
-                              </p:par>
-                            </p:childTnLst>
-                          </p:cTn>
-                        </p:par>
-                      </p:childTnLst>
-                    </p:cTn>
-                  </p:par>
-                </p:childTnLst>
-              </p:cTn>
-              <p:prevCondLst>
-                <p:cond evt="onPrev" delay="0">
-                  <p:tgtEl>
-                    <p:sldTgt/>
-                  </p:tgtEl>
-                </p:cond>
-              </p:prevCondLst>
-              <p:nextCondLst>
-                <p:cond evt="onNext" delay="0">
-                  <p:tgtEl>
-                    <p:sldTgt/>
-                  </p:tgtEl>
-                </p:cond>
-              </p:nextCondLst>
-            </p:seq>
-          </p:childTnLst>
-        </p:cTn>
-      </p:par>
-    </p:tnLst>
-  </p:timing>
+  <mc:AlternateContent xmlns:mc="http://schemas.openxmlformats.org/markup-compatibility/2006">
+    <mc:Choice xmlns:p159="http://schemas.microsoft.com/office/powerpoint/2015/09/main" Requires="p159">
+      <p:transition xmlns:p14="http://schemas.microsoft.com/office/powerpoint/2010/main" spd="slow" p14:dur="2000">
+        <p159:morph option="byObject"/>
+      </p:transition>
+    </mc:Choice>
+    <mc:Fallback>
+      <p:transition spd="slow">
+        <p:fade/>
+      </p:transition>
+    </mc:Fallback>
+  </mc:AlternateContent>
 </p:sld>
 </file>
 
@@ -29085,15 +28067,7 @@
                 <a:ea typeface="+mn-ea"/>
                 <a:cs typeface="+mn-cs"/>
               </a:rPr>
-              <a:t>Lets move on with </a:t>
-            </a:r>
-            <a:r>
-              <a:rPr lang="en-US" sz="3200">
-                <a:latin typeface="+mn-lt"/>
-                <a:ea typeface="+mn-ea"/>
-                <a:cs typeface="+mn-cs"/>
-              </a:rPr>
-              <a:t>our project…</a:t>
+              <a:t>Lets move on with our project…</a:t>
             </a:r>
             <a:endParaRPr lang="en-US" dirty="0">
               <a:latin typeface="Consolas" panose="020B0609020204030204" pitchFamily="49" charset="0"/>
@@ -29111,6 +28085,18 @@
   <p:clrMapOvr>
     <a:masterClrMapping/>
   </p:clrMapOvr>
+  <mc:AlternateContent xmlns:mc="http://schemas.openxmlformats.org/markup-compatibility/2006">
+    <mc:Choice xmlns:p159="http://schemas.microsoft.com/office/powerpoint/2015/09/main" Requires="p159">
+      <p:transition xmlns:p14="http://schemas.microsoft.com/office/powerpoint/2010/main" spd="slow" p14:dur="2000">
+        <p159:morph option="byObject"/>
+      </p:transition>
+    </mc:Choice>
+    <mc:Fallback>
+      <p:transition spd="slow">
+        <p:fade/>
+      </p:transition>
+    </mc:Fallback>
+  </mc:AlternateContent>
 </p:sld>
 </file>
 

</xml_diff>